<commit_message>
added problem statement on batch
</commit_message>
<xml_diff>
--- a/Week-1/Day-1/DataEngineering_Azure_Fundamentals.pptx
+++ b/Week-1/Day-1/DataEngineering_Azure_Fundamentals.pptx
@@ -22,10 +22,11 @@
     <p:sldId id="268" r:id="rId16"/>
     <p:sldId id="261" r:id="rId17"/>
     <p:sldId id="262" r:id="rId18"/>
-    <p:sldId id="263" r:id="rId19"/>
-    <p:sldId id="264" r:id="rId20"/>
-    <p:sldId id="265" r:id="rId21"/>
-    <p:sldId id="276" r:id="rId22"/>
+    <p:sldId id="277" r:id="rId19"/>
+    <p:sldId id="263" r:id="rId20"/>
+    <p:sldId id="264" r:id="rId21"/>
+    <p:sldId id="265" r:id="rId22"/>
+    <p:sldId id="276" r:id="rId23"/>
   </p:sldIdLst>
   <p:sldSz cx="9144000" cy="6858000" type="screen4x3"/>
   <p:notesSz cx="6858000" cy="9144000"/>
@@ -17162,6 +17163,7 @@
           <a:lstStyle/>
           <a:p>
             <a:r>
+              <a:rPr dirty="0"/>
               <a:t>Azure Resource Hierarchy</a:t>
             </a:r>
           </a:p>
@@ -17215,6 +17217,98 @@
 </file>
 
 <file path=ppt/slides/slide18.xml><?xml version="1.0" encoding="utf-8"?>
+<p:sld xmlns:a="http://schemas.openxmlformats.org/drawingml/2006/main" xmlns:r="http://schemas.openxmlformats.org/officeDocument/2006/relationships" xmlns:p="http://schemas.openxmlformats.org/presentationml/2006/main">
+  <p:cSld>
+    <p:spTree>
+      <p:nvGrpSpPr>
+        <p:cNvPr id="1" name=""/>
+        <p:cNvGrpSpPr/>
+        <p:nvPr/>
+      </p:nvGrpSpPr>
+      <p:grpSpPr>
+        <a:xfrm>
+          <a:off x="0" y="0"/>
+          <a:ext cx="0" cy="0"/>
+          <a:chOff x="0" y="0"/>
+          <a:chExt cx="0" cy="0"/>
+        </a:xfrm>
+      </p:grpSpPr>
+      <p:sp>
+        <p:nvSpPr>
+          <p:cNvPr id="2" name="Title 1">
+            <a:extLst>
+              <a:ext uri="{FF2B5EF4-FFF2-40B4-BE49-F238E27FC236}">
+                <a16:creationId xmlns:a16="http://schemas.microsoft.com/office/drawing/2014/main" id="{93D5F07D-CA40-5A88-B262-466AB8147F50}"/>
+              </a:ext>
+            </a:extLst>
+          </p:cNvPr>
+          <p:cNvSpPr>
+            <a:spLocks noGrp="1"/>
+          </p:cNvSpPr>
+          <p:nvPr>
+            <p:ph type="title"/>
+          </p:nvPr>
+        </p:nvSpPr>
+        <p:spPr/>
+        <p:txBody>
+          <a:bodyPr/>
+          <a:lstStyle/>
+          <a:p>
+            <a:r>
+              <a:rPr lang="en-IN" dirty="0"/>
+              <a:t>Azure Resource Hierarchy(Example)</a:t>
+            </a:r>
+            <a:r>
+              <a:rPr lang="en-US" dirty="0"/>
+              <a:t> </a:t>
+            </a:r>
+            <a:endParaRPr lang="en-IN" dirty="0"/>
+          </a:p>
+        </p:txBody>
+      </p:sp>
+      <p:pic>
+        <p:nvPicPr>
+          <p:cNvPr id="5" name="Content Placeholder 4">
+            <a:extLst>
+              <a:ext uri="{FF2B5EF4-FFF2-40B4-BE49-F238E27FC236}">
+                <a16:creationId xmlns:a16="http://schemas.microsoft.com/office/drawing/2014/main" id="{05679F3C-F2EB-39A3-AD8C-F1C8F9655C23}"/>
+              </a:ext>
+            </a:extLst>
+          </p:cNvPr>
+          <p:cNvPicPr>
+            <a:picLocks noGrp="1" noChangeAspect="1"/>
+          </p:cNvPicPr>
+          <p:nvPr>
+            <p:ph idx="1"/>
+          </p:nvPr>
+        </p:nvPicPr>
+        <p:blipFill>
+          <a:blip r:embed="rId2"/>
+          <a:stretch>
+            <a:fillRect/>
+          </a:stretch>
+        </p:blipFill>
+        <p:spPr>
+          <a:xfrm>
+            <a:off x="1396206" y="2286000"/>
+            <a:ext cx="6034087" cy="4022725"/>
+          </a:xfrm>
+        </p:spPr>
+      </p:pic>
+    </p:spTree>
+    <p:extLst>
+      <p:ext uri="{BB962C8B-B14F-4D97-AF65-F5344CB8AC3E}">
+        <p14:creationId xmlns:p14="http://schemas.microsoft.com/office/powerpoint/2010/main" val="1339567860"/>
+      </p:ext>
+    </p:extLst>
+  </p:cSld>
+  <p:clrMapOvr>
+    <a:masterClrMapping/>
+  </p:clrMapOvr>
+</p:sld>
+</file>
+
+<file path=ppt/slides/slide19.xml><?xml version="1.0" encoding="utf-8"?>
 <p:sld xmlns:a="http://schemas.openxmlformats.org/drawingml/2006/main" xmlns:r="http://schemas.openxmlformats.org/officeDocument/2006/relationships" xmlns:p="http://schemas.openxmlformats.org/presentationml/2006/main">
   <p:cSld>
     <p:spTree>
@@ -17287,91 +17381,6 @@
           <a:p>
             <a:r>
               <a:t>Azure Advisor for optimization recommendations.</a:t>
-            </a:r>
-          </a:p>
-        </p:txBody>
-      </p:sp>
-    </p:spTree>
-  </p:cSld>
-  <p:clrMapOvr>
-    <a:masterClrMapping/>
-  </p:clrMapOvr>
-</p:sld>
-</file>
-
-<file path=ppt/slides/slide19.xml><?xml version="1.0" encoding="utf-8"?>
-<p:sld xmlns:a="http://schemas.openxmlformats.org/drawingml/2006/main" xmlns:r="http://schemas.openxmlformats.org/officeDocument/2006/relationships" xmlns:p="http://schemas.openxmlformats.org/presentationml/2006/main">
-  <p:cSld>
-    <p:spTree>
-      <p:nvGrpSpPr>
-        <p:cNvPr id="1" name=""/>
-        <p:cNvGrpSpPr/>
-        <p:nvPr/>
-      </p:nvGrpSpPr>
-      <p:grpSpPr>
-        <a:xfrm>
-          <a:off x="0" y="0"/>
-          <a:ext cx="0" cy="0"/>
-          <a:chOff x="0" y="0"/>
-          <a:chExt cx="0" cy="0"/>
-        </a:xfrm>
-      </p:grpSpPr>
-      <p:sp>
-        <p:nvSpPr>
-          <p:cNvPr id="2" name="Title 1"/>
-          <p:cNvSpPr>
-            <a:spLocks noGrp="1"/>
-          </p:cNvSpPr>
-          <p:nvPr>
-            <p:ph type="title"/>
-          </p:nvPr>
-        </p:nvSpPr>
-        <p:spPr/>
-        <p:txBody>
-          <a:bodyPr/>
-          <a:lstStyle/>
-          <a:p>
-            <a:r>
-              <a:t>Azure CLI &amp; PowerShell Basics</a:t>
-            </a:r>
-          </a:p>
-        </p:txBody>
-      </p:sp>
-      <p:sp>
-        <p:nvSpPr>
-          <p:cNvPr id="3" name="Content Placeholder 2"/>
-          <p:cNvSpPr>
-            <a:spLocks noGrp="1"/>
-          </p:cNvSpPr>
-          <p:nvPr>
-            <p:ph idx="1"/>
-          </p:nvPr>
-        </p:nvSpPr>
-        <p:spPr/>
-        <p:txBody>
-          <a:bodyPr/>
-          <a:lstStyle/>
-          <a:p>
-            <a:endParaRPr/>
-          </a:p>
-          <a:p>
-            <a:r>
-              <a:t>Azure CLI: Cross-platform command-line tool (az commands).</a:t>
-            </a:r>
-          </a:p>
-          <a:p>
-            <a:r>
-              <a:t>PowerShell: Windows-centric scripting with Az module.</a:t>
-            </a:r>
-          </a:p>
-          <a:p>
-            <a:r>
-              <a:t>Common tasks: Deploy resources, manage users, configure networking.</a:t>
-            </a:r>
-          </a:p>
-          <a:p>
-            <a:r>
-              <a:t>Automation: Scripting and Infrastructure as Code (IaC).</a:t>
             </a:r>
           </a:p>
         </p:txBody>
@@ -17497,6 +17506,91 @@
           <a:lstStyle/>
           <a:p>
             <a:r>
+              <a:t>Azure CLI &amp; PowerShell Basics</a:t>
+            </a:r>
+          </a:p>
+        </p:txBody>
+      </p:sp>
+      <p:sp>
+        <p:nvSpPr>
+          <p:cNvPr id="3" name="Content Placeholder 2"/>
+          <p:cNvSpPr>
+            <a:spLocks noGrp="1"/>
+          </p:cNvSpPr>
+          <p:nvPr>
+            <p:ph idx="1"/>
+          </p:nvPr>
+        </p:nvSpPr>
+        <p:spPr/>
+        <p:txBody>
+          <a:bodyPr/>
+          <a:lstStyle/>
+          <a:p>
+            <a:endParaRPr/>
+          </a:p>
+          <a:p>
+            <a:r>
+              <a:t>Azure CLI: Cross-platform command-line tool (az commands).</a:t>
+            </a:r>
+          </a:p>
+          <a:p>
+            <a:r>
+              <a:t>PowerShell: Windows-centric scripting with Az module.</a:t>
+            </a:r>
+          </a:p>
+          <a:p>
+            <a:r>
+              <a:t>Common tasks: Deploy resources, manage users, configure networking.</a:t>
+            </a:r>
+          </a:p>
+          <a:p>
+            <a:r>
+              <a:t>Automation: Scripting and Infrastructure as Code (IaC).</a:t>
+            </a:r>
+          </a:p>
+        </p:txBody>
+      </p:sp>
+    </p:spTree>
+  </p:cSld>
+  <p:clrMapOvr>
+    <a:masterClrMapping/>
+  </p:clrMapOvr>
+</p:sld>
+</file>
+
+<file path=ppt/slides/slide21.xml><?xml version="1.0" encoding="utf-8"?>
+<p:sld xmlns:a="http://schemas.openxmlformats.org/drawingml/2006/main" xmlns:r="http://schemas.openxmlformats.org/officeDocument/2006/relationships" xmlns:p="http://schemas.openxmlformats.org/presentationml/2006/main">
+  <p:cSld>
+    <p:spTree>
+      <p:nvGrpSpPr>
+        <p:cNvPr id="1" name=""/>
+        <p:cNvGrpSpPr/>
+        <p:nvPr/>
+      </p:nvGrpSpPr>
+      <p:grpSpPr>
+        <a:xfrm>
+          <a:off x="0" y="0"/>
+          <a:ext cx="0" cy="0"/>
+          <a:chOff x="0" y="0"/>
+          <a:chExt cx="0" cy="0"/>
+        </a:xfrm>
+      </p:grpSpPr>
+      <p:sp>
+        <p:nvSpPr>
+          <p:cNvPr id="2" name="Title 1"/>
+          <p:cNvSpPr>
+            <a:spLocks noGrp="1"/>
+          </p:cNvSpPr>
+          <p:nvPr>
+            <p:ph type="title"/>
+          </p:nvPr>
+        </p:nvSpPr>
+        <p:spPr/>
+        <p:txBody>
+          <a:bodyPr/>
+          <a:lstStyle/>
+          <a:p>
+            <a:r>
               <a:t>Cost Management in Azure</a:t>
             </a:r>
           </a:p>
@@ -17549,7 +17643,7 @@
 </p:sld>
 </file>
 
-<file path=ppt/slides/slide21.xml><?xml version="1.0" encoding="utf-8"?>
+<file path=ppt/slides/slide22.xml><?xml version="1.0" encoding="utf-8"?>
 <p:sld xmlns:a="http://schemas.openxmlformats.org/drawingml/2006/main" xmlns:r="http://schemas.openxmlformats.org/officeDocument/2006/relationships" xmlns:p="http://schemas.openxmlformats.org/presentationml/2006/main">
   <p:cSld>
     <p:spTree>

</xml_diff>